<commit_message>
Small edits to three cycles diagram, rename files, move to SVG format.
</commit_message>
<xml_diff>
--- a/images/three-cycles-diagram.pptx
+++ b/images/three-cycles-diagram.pptx
@@ -270,7 +270,7 @@
           <a:p>
             <a:fld id="{F908B1BA-8545-4C4D-9CC5-365AF5F37DF6}" type="datetimeFigureOut">
               <a:rPr lang="en-US" smtClean="0"/>
-              <a:t>7/11/25</a:t>
+              <a:t>7/30/25</a:t>
             </a:fld>
             <a:endParaRPr lang="en-US"/>
           </a:p>
@@ -468,7 +468,7 @@
           <a:p>
             <a:fld id="{F908B1BA-8545-4C4D-9CC5-365AF5F37DF6}" type="datetimeFigureOut">
               <a:rPr lang="en-US" smtClean="0"/>
-              <a:t>7/11/25</a:t>
+              <a:t>7/30/25</a:t>
             </a:fld>
             <a:endParaRPr lang="en-US"/>
           </a:p>
@@ -676,7 +676,7 @@
           <a:p>
             <a:fld id="{F908B1BA-8545-4C4D-9CC5-365AF5F37DF6}" type="datetimeFigureOut">
               <a:rPr lang="en-US" smtClean="0"/>
-              <a:t>7/11/25</a:t>
+              <a:t>7/30/25</a:t>
             </a:fld>
             <a:endParaRPr lang="en-US"/>
           </a:p>
@@ -874,7 +874,7 @@
           <a:p>
             <a:fld id="{F908B1BA-8545-4C4D-9CC5-365AF5F37DF6}" type="datetimeFigureOut">
               <a:rPr lang="en-US" smtClean="0"/>
-              <a:t>7/11/25</a:t>
+              <a:t>7/30/25</a:t>
             </a:fld>
             <a:endParaRPr lang="en-US"/>
           </a:p>
@@ -1149,7 +1149,7 @@
           <a:p>
             <a:fld id="{F908B1BA-8545-4C4D-9CC5-365AF5F37DF6}" type="datetimeFigureOut">
               <a:rPr lang="en-US" smtClean="0"/>
-              <a:t>7/11/25</a:t>
+              <a:t>7/30/25</a:t>
             </a:fld>
             <a:endParaRPr lang="en-US"/>
           </a:p>
@@ -1414,7 +1414,7 @@
           <a:p>
             <a:fld id="{F908B1BA-8545-4C4D-9CC5-365AF5F37DF6}" type="datetimeFigureOut">
               <a:rPr lang="en-US" smtClean="0"/>
-              <a:t>7/11/25</a:t>
+              <a:t>7/30/25</a:t>
             </a:fld>
             <a:endParaRPr lang="en-US"/>
           </a:p>
@@ -1826,7 +1826,7 @@
           <a:p>
             <a:fld id="{F908B1BA-8545-4C4D-9CC5-365AF5F37DF6}" type="datetimeFigureOut">
               <a:rPr lang="en-US" smtClean="0"/>
-              <a:t>7/11/25</a:t>
+              <a:t>7/30/25</a:t>
             </a:fld>
             <a:endParaRPr lang="en-US"/>
           </a:p>
@@ -1967,7 +1967,7 @@
           <a:p>
             <a:fld id="{F908B1BA-8545-4C4D-9CC5-365AF5F37DF6}" type="datetimeFigureOut">
               <a:rPr lang="en-US" smtClean="0"/>
-              <a:t>7/11/25</a:t>
+              <a:t>7/30/25</a:t>
             </a:fld>
             <a:endParaRPr lang="en-US"/>
           </a:p>
@@ -2080,7 +2080,7 @@
           <a:p>
             <a:fld id="{F908B1BA-8545-4C4D-9CC5-365AF5F37DF6}" type="datetimeFigureOut">
               <a:rPr lang="en-US" smtClean="0"/>
-              <a:t>7/11/25</a:t>
+              <a:t>7/30/25</a:t>
             </a:fld>
             <a:endParaRPr lang="en-US"/>
           </a:p>
@@ -2391,7 +2391,7 @@
           <a:p>
             <a:fld id="{F908B1BA-8545-4C4D-9CC5-365AF5F37DF6}" type="datetimeFigureOut">
               <a:rPr lang="en-US" smtClean="0"/>
-              <a:t>7/11/25</a:t>
+              <a:t>7/30/25</a:t>
             </a:fld>
             <a:endParaRPr lang="en-US"/>
           </a:p>
@@ -2679,7 +2679,7 @@
           <a:p>
             <a:fld id="{F908B1BA-8545-4C4D-9CC5-365AF5F37DF6}" type="datetimeFigureOut">
               <a:rPr lang="en-US" smtClean="0"/>
-              <a:t>7/11/25</a:t>
+              <a:t>7/30/25</a:t>
             </a:fld>
             <a:endParaRPr lang="en-US"/>
           </a:p>
@@ -2920,7 +2920,7 @@
           <a:p>
             <a:fld id="{F908B1BA-8545-4C4D-9CC5-365AF5F37DF6}" type="datetimeFigureOut">
               <a:rPr lang="en-US" smtClean="0"/>
-              <a:t>7/11/25</a:t>
+              <a:t>7/30/25</a:t>
             </a:fld>
             <a:endParaRPr lang="en-US"/>
           </a:p>
@@ -4311,7 +4311,8 @@
           </a:prstGeom>
           <a:solidFill>
             <a:schemeClr val="accent6">
-              <a:lumMod val="75000"/>
+              <a:lumMod val="60000"/>
+              <a:lumOff val="40000"/>
             </a:schemeClr>
           </a:solidFill>
         </p:spPr>
@@ -4335,9 +4336,11 @@
           <a:p>
             <a:pPr algn="ctr"/>
             <a:r>
-              <a:rPr lang="en-US" sz="1600" b="1" dirty="0">
+              <a:rPr lang="en-US" sz="1400" b="1" dirty="0">
                 <a:solidFill>
-                  <a:srgbClr val="00B050"/>
+                  <a:schemeClr val="accent6">
+                    <a:lumMod val="75000"/>
+                  </a:schemeClr>
                 </a:solidFill>
               </a:rPr>
               <a:t>Success?</a:t>
@@ -4487,8 +4490,8 @@
         </p:nvSpPr>
         <p:spPr>
           <a:xfrm>
-            <a:off x="1833757" y="1955191"/>
-            <a:ext cx="442621" cy="514012"/>
+            <a:off x="1833757" y="1975243"/>
+            <a:ext cx="442621" cy="443150"/>
           </a:xfrm>
           <a:prstGeom prst="donut">
             <a:avLst>
@@ -4542,8 +4545,8 @@
         </p:nvSpPr>
         <p:spPr>
           <a:xfrm>
-            <a:off x="1833757" y="3182944"/>
-            <a:ext cx="442621" cy="514012"/>
+            <a:off x="1833757" y="3201951"/>
+            <a:ext cx="442621" cy="443150"/>
           </a:xfrm>
           <a:prstGeom prst="donut">
             <a:avLst>
@@ -4597,8 +4600,8 @@
         </p:nvSpPr>
         <p:spPr>
           <a:xfrm>
-            <a:off x="1838116" y="4409653"/>
-            <a:ext cx="442621" cy="514012"/>
+            <a:off x="1833757" y="4428659"/>
+            <a:ext cx="442621" cy="443150"/>
           </a:xfrm>
           <a:prstGeom prst="donut">
             <a:avLst>
@@ -4922,7 +4925,8 @@
           </a:prstGeom>
           <a:solidFill>
             <a:schemeClr val="accent6">
-              <a:lumMod val="75000"/>
+              <a:lumMod val="60000"/>
+              <a:lumOff val="40000"/>
             </a:schemeClr>
           </a:solidFill>
         </p:spPr>
@@ -4946,9 +4950,11 @@
           <a:p>
             <a:pPr algn="ctr"/>
             <a:r>
-              <a:rPr lang="en-US" sz="1600" b="1" dirty="0">
+              <a:rPr lang="en-US" sz="1400" b="1" dirty="0">
                 <a:solidFill>
-                  <a:srgbClr val="00B050"/>
+                  <a:schemeClr val="accent6">
+                    <a:lumMod val="75000"/>
+                  </a:schemeClr>
                 </a:solidFill>
               </a:rPr>
               <a:t>Success?</a:t>

</xml_diff>